<commit_message>
extended on FEM basics
</commit_message>
<xml_diff>
--- a/doc/latex/figures/figures.pptx
+++ b/doc/latex/figures/figures.pptx
@@ -6,6 +6,7 @@
   </p:sldMasterIdLst>
   <p:sldIdLst>
     <p:sldId id="257" r:id="rId2"/>
+    <p:sldId id="258" r:id="rId3"/>
   </p:sldIdLst>
   <p:sldSz cx="12192000" cy="6858000"/>
   <p:notesSz cx="6858000" cy="9144000"/>
@@ -104,6 +105,11 @@
       </a:defRPr>
     </a:lvl9pPr>
   </p:defaultTextStyle>
+  <p:extLst>
+    <p:ext uri="{EFAFB233-063F-42B5-8137-9DF3F51BA10A}">
+      <p15:sldGuideLst xmlns:p15="http://schemas.microsoft.com/office/powerpoint/2012/main"/>
+    </p:ext>
+  </p:extLst>
 </p:presentation>
 </file>
 
@@ -254,7 +260,7 @@
           <a:p>
             <a:fld id="{CB928F45-986A-4318-8FF5-318E16FFB886}" type="datetimeFigureOut">
               <a:rPr lang="de-DE" smtClean="0"/>
-              <a:t>21.10.2024</a:t>
+              <a:t>27.10.2024</a:t>
             </a:fld>
             <a:endParaRPr lang="de-DE"/>
           </a:p>
@@ -452,7 +458,7 @@
           <a:p>
             <a:fld id="{CB928F45-986A-4318-8FF5-318E16FFB886}" type="datetimeFigureOut">
               <a:rPr lang="de-DE" smtClean="0"/>
-              <a:t>21.10.2024</a:t>
+              <a:t>27.10.2024</a:t>
             </a:fld>
             <a:endParaRPr lang="de-DE"/>
           </a:p>
@@ -660,7 +666,7 @@
           <a:p>
             <a:fld id="{CB928F45-986A-4318-8FF5-318E16FFB886}" type="datetimeFigureOut">
               <a:rPr lang="de-DE" smtClean="0"/>
-              <a:t>21.10.2024</a:t>
+              <a:t>27.10.2024</a:t>
             </a:fld>
             <a:endParaRPr lang="de-DE"/>
           </a:p>
@@ -858,7 +864,7 @@
           <a:p>
             <a:fld id="{CB928F45-986A-4318-8FF5-318E16FFB886}" type="datetimeFigureOut">
               <a:rPr lang="de-DE" smtClean="0"/>
-              <a:t>21.10.2024</a:t>
+              <a:t>27.10.2024</a:t>
             </a:fld>
             <a:endParaRPr lang="de-DE"/>
           </a:p>
@@ -1133,7 +1139,7 @@
           <a:p>
             <a:fld id="{CB928F45-986A-4318-8FF5-318E16FFB886}" type="datetimeFigureOut">
               <a:rPr lang="de-DE" smtClean="0"/>
-              <a:t>21.10.2024</a:t>
+              <a:t>27.10.2024</a:t>
             </a:fld>
             <a:endParaRPr lang="de-DE"/>
           </a:p>
@@ -1398,7 +1404,7 @@
           <a:p>
             <a:fld id="{CB928F45-986A-4318-8FF5-318E16FFB886}" type="datetimeFigureOut">
               <a:rPr lang="de-DE" smtClean="0"/>
-              <a:t>21.10.2024</a:t>
+              <a:t>27.10.2024</a:t>
             </a:fld>
             <a:endParaRPr lang="de-DE"/>
           </a:p>
@@ -1810,7 +1816,7 @@
           <a:p>
             <a:fld id="{CB928F45-986A-4318-8FF5-318E16FFB886}" type="datetimeFigureOut">
               <a:rPr lang="de-DE" smtClean="0"/>
-              <a:t>21.10.2024</a:t>
+              <a:t>27.10.2024</a:t>
             </a:fld>
             <a:endParaRPr lang="de-DE"/>
           </a:p>
@@ -1951,7 +1957,7 @@
           <a:p>
             <a:fld id="{CB928F45-986A-4318-8FF5-318E16FFB886}" type="datetimeFigureOut">
               <a:rPr lang="de-DE" smtClean="0"/>
-              <a:t>21.10.2024</a:t>
+              <a:t>27.10.2024</a:t>
             </a:fld>
             <a:endParaRPr lang="de-DE"/>
           </a:p>
@@ -2064,7 +2070,7 @@
           <a:p>
             <a:fld id="{CB928F45-986A-4318-8FF5-318E16FFB886}" type="datetimeFigureOut">
               <a:rPr lang="de-DE" smtClean="0"/>
-              <a:t>21.10.2024</a:t>
+              <a:t>27.10.2024</a:t>
             </a:fld>
             <a:endParaRPr lang="de-DE"/>
           </a:p>
@@ -2375,7 +2381,7 @@
           <a:p>
             <a:fld id="{CB928F45-986A-4318-8FF5-318E16FFB886}" type="datetimeFigureOut">
               <a:rPr lang="de-DE" smtClean="0"/>
-              <a:t>21.10.2024</a:t>
+              <a:t>27.10.2024</a:t>
             </a:fld>
             <a:endParaRPr lang="de-DE"/>
           </a:p>
@@ -2663,7 +2669,7 @@
           <a:p>
             <a:fld id="{CB928F45-986A-4318-8FF5-318E16FFB886}" type="datetimeFigureOut">
               <a:rPr lang="de-DE" smtClean="0"/>
-              <a:t>21.10.2024</a:t>
+              <a:t>27.10.2024</a:t>
             </a:fld>
             <a:endParaRPr lang="de-DE"/>
           </a:p>
@@ -2904,7 +2910,7 @@
           <a:p>
             <a:fld id="{CB928F45-986A-4318-8FF5-318E16FFB886}" type="datetimeFigureOut">
               <a:rPr lang="de-DE" smtClean="0"/>
-              <a:t>21.10.2024</a:t>
+              <a:t>27.10.2024</a:t>
             </a:fld>
             <a:endParaRPr lang="de-DE"/>
           </a:p>
@@ -3779,8 +3785,8 @@
           </a:fontRef>
         </p:style>
       </p:cxnSp>
-      <mc:AlternateContent xmlns:mc="http://schemas.openxmlformats.org/markup-compatibility/2006">
-        <mc:Choice xmlns:a14="http://schemas.microsoft.com/office/drawing/2010/main" Requires="a14">
+      <mc:AlternateContent xmlns:mc="http://schemas.openxmlformats.org/markup-compatibility/2006" xmlns:a14="http://schemas.microsoft.com/office/drawing/2010/main">
+        <mc:Choice Requires="a14">
           <p:sp>
             <p:nvSpPr>
               <p:cNvPr id="24" name="Textfeld 23">
@@ -3809,6 +3815,7 @@
               </a:bodyPr>
               <a:lstStyle/>
               <a:p>
+                <a:pPr/>
                 <a14:m>
                   <m:oMathPara xmlns:m="http://schemas.openxmlformats.org/officeDocument/2006/math">
                     <m:oMathParaPr>
@@ -3848,7 +3855,7 @@
             </p:txBody>
           </p:sp>
         </mc:Choice>
-        <mc:Fallback>
+        <mc:Fallback xmlns="">
           <p:sp>
             <p:nvSpPr>
               <p:cNvPr id="24" name="Textfeld 23">
@@ -3893,8 +3900,8 @@
           </p:sp>
         </mc:Fallback>
       </mc:AlternateContent>
-      <mc:AlternateContent xmlns:mc="http://schemas.openxmlformats.org/markup-compatibility/2006">
-        <mc:Choice xmlns:a14="http://schemas.microsoft.com/office/drawing/2010/main" Requires="a14">
+      <mc:AlternateContent xmlns:mc="http://schemas.openxmlformats.org/markup-compatibility/2006" xmlns:a14="http://schemas.microsoft.com/office/drawing/2010/main">
+        <mc:Choice Requires="a14">
           <p:sp>
             <p:nvSpPr>
               <p:cNvPr id="25" name="Textfeld 24">
@@ -3923,6 +3930,7 @@
               </a:bodyPr>
               <a:lstStyle/>
               <a:p>
+                <a:pPr/>
                 <a14:m>
                   <m:oMathPara xmlns:m="http://schemas.openxmlformats.org/officeDocument/2006/math">
                     <m:oMathParaPr>
@@ -3962,7 +3970,7 @@
             </p:txBody>
           </p:sp>
         </mc:Choice>
-        <mc:Fallback>
+        <mc:Fallback xmlns="">
           <p:sp>
             <p:nvSpPr>
               <p:cNvPr id="25" name="Textfeld 24">
@@ -4011,6 +4019,802 @@
     <p:extLst>
       <p:ext uri="{BB962C8B-B14F-4D97-AF65-F5344CB8AC3E}">
         <p14:creationId xmlns:p14="http://schemas.microsoft.com/office/powerpoint/2010/main" val="2142502489"/>
+      </p:ext>
+    </p:extLst>
+  </p:cSld>
+  <p:clrMapOvr>
+    <a:masterClrMapping/>
+  </p:clrMapOvr>
+</p:sld>
+</file>
+
+<file path=ppt/slides/slide2.xml><?xml version="1.0" encoding="utf-8"?>
+<p:sld xmlns:a="http://schemas.openxmlformats.org/drawingml/2006/main" xmlns:r="http://schemas.openxmlformats.org/officeDocument/2006/relationships" xmlns:p="http://schemas.openxmlformats.org/presentationml/2006/main">
+  <p:cSld>
+    <p:spTree>
+      <p:nvGrpSpPr>
+        <p:cNvPr id="1" name=""/>
+        <p:cNvGrpSpPr/>
+        <p:nvPr/>
+      </p:nvGrpSpPr>
+      <p:grpSpPr>
+        <a:xfrm>
+          <a:off x="0" y="0"/>
+          <a:ext cx="0" cy="0"/>
+          <a:chOff x="0" y="0"/>
+          <a:chExt cx="0" cy="0"/>
+        </a:xfrm>
+      </p:grpSpPr>
+      <p:cxnSp>
+        <p:nvCxnSpPr>
+          <p:cNvPr id="3" name="Gerade Verbindung mit Pfeil 2">
+            <a:extLst>
+              <a:ext uri="{FF2B5EF4-FFF2-40B4-BE49-F238E27FC236}">
+                <a16:creationId xmlns:a16="http://schemas.microsoft.com/office/drawing/2014/main" id="{01459448-7298-4A9F-B5C9-4FC558A44C76}"/>
+              </a:ext>
+            </a:extLst>
+          </p:cNvPr>
+          <p:cNvCxnSpPr>
+            <a:cxnSpLocks/>
+          </p:cNvCxnSpPr>
+          <p:nvPr/>
+        </p:nvCxnSpPr>
+        <p:spPr>
+          <a:xfrm>
+            <a:off x="1184728" y="3947954"/>
+            <a:ext cx="4411655" cy="0"/>
+          </a:xfrm>
+          <a:prstGeom prst="straightConnector1">
+            <a:avLst/>
+          </a:prstGeom>
+          <a:ln w="19050">
+            <a:solidFill>
+              <a:schemeClr val="tx1"/>
+            </a:solidFill>
+            <a:tailEnd type="triangle"/>
+          </a:ln>
+        </p:spPr>
+        <p:style>
+          <a:lnRef idx="1">
+            <a:schemeClr val="accent1"/>
+          </a:lnRef>
+          <a:fillRef idx="0">
+            <a:schemeClr val="accent1"/>
+          </a:fillRef>
+          <a:effectRef idx="0">
+            <a:schemeClr val="accent1"/>
+          </a:effectRef>
+          <a:fontRef idx="minor">
+            <a:schemeClr val="tx1"/>
+          </a:fontRef>
+        </p:style>
+      </p:cxnSp>
+      <p:cxnSp>
+        <p:nvCxnSpPr>
+          <p:cNvPr id="5" name="Gerade Verbindung mit Pfeil 4">
+            <a:extLst>
+              <a:ext uri="{FF2B5EF4-FFF2-40B4-BE49-F238E27FC236}">
+                <a16:creationId xmlns:a16="http://schemas.microsoft.com/office/drawing/2014/main" id="{C8D1ECFE-E889-4497-B4C4-120CD3028761}"/>
+              </a:ext>
+            </a:extLst>
+          </p:cNvPr>
+          <p:cNvCxnSpPr/>
+          <p:nvPr/>
+        </p:nvCxnSpPr>
+        <p:spPr>
+          <a:xfrm flipV="1">
+            <a:off x="1184728" y="0"/>
+            <a:ext cx="0" cy="3947954"/>
+          </a:xfrm>
+          <a:prstGeom prst="straightConnector1">
+            <a:avLst/>
+          </a:prstGeom>
+          <a:ln w="19050">
+            <a:solidFill>
+              <a:schemeClr val="tx1"/>
+            </a:solidFill>
+            <a:tailEnd type="triangle"/>
+          </a:ln>
+        </p:spPr>
+        <p:style>
+          <a:lnRef idx="1">
+            <a:schemeClr val="accent1"/>
+          </a:lnRef>
+          <a:fillRef idx="0">
+            <a:schemeClr val="accent1"/>
+          </a:fillRef>
+          <a:effectRef idx="0">
+            <a:schemeClr val="accent1"/>
+          </a:effectRef>
+          <a:fontRef idx="minor">
+            <a:schemeClr val="tx1"/>
+          </a:fontRef>
+        </p:style>
+      </p:cxnSp>
+      <p:cxnSp>
+        <p:nvCxnSpPr>
+          <p:cNvPr id="8" name="Gerader Verbinder 7">
+            <a:extLst>
+              <a:ext uri="{FF2B5EF4-FFF2-40B4-BE49-F238E27FC236}">
+                <a16:creationId xmlns:a16="http://schemas.microsoft.com/office/drawing/2014/main" id="{A9B787FD-99CE-4AD0-841C-3439689B1E0F}"/>
+              </a:ext>
+            </a:extLst>
+          </p:cNvPr>
+          <p:cNvCxnSpPr>
+            <a:cxnSpLocks/>
+          </p:cNvCxnSpPr>
+          <p:nvPr/>
+        </p:nvCxnSpPr>
+        <p:spPr>
+          <a:xfrm>
+            <a:off x="1184728" y="762722"/>
+            <a:ext cx="3185231" cy="3185231"/>
+          </a:xfrm>
+          <a:prstGeom prst="line">
+            <a:avLst/>
+          </a:prstGeom>
+          <a:ln w="38100" cap="rnd">
+            <a:solidFill>
+              <a:schemeClr val="tx1"/>
+            </a:solidFill>
+          </a:ln>
+        </p:spPr>
+        <p:style>
+          <a:lnRef idx="1">
+            <a:schemeClr val="accent1"/>
+          </a:lnRef>
+          <a:fillRef idx="0">
+            <a:schemeClr val="accent1"/>
+          </a:fillRef>
+          <a:effectRef idx="0">
+            <a:schemeClr val="accent1"/>
+          </a:effectRef>
+          <a:fontRef idx="minor">
+            <a:schemeClr val="tx1"/>
+          </a:fontRef>
+        </p:style>
+      </p:cxnSp>
+      <mc:AlternateContent xmlns:mc="http://schemas.openxmlformats.org/markup-compatibility/2006" xmlns:a14="http://schemas.microsoft.com/office/drawing/2010/main">
+        <mc:Choice Requires="a14">
+          <p:sp>
+            <p:nvSpPr>
+              <p:cNvPr id="12" name="Textfeld 11">
+                <a:extLst>
+                  <a:ext uri="{FF2B5EF4-FFF2-40B4-BE49-F238E27FC236}">
+                    <a16:creationId xmlns:a16="http://schemas.microsoft.com/office/drawing/2014/main" id="{2400FDE4-F3AE-4C9E-BDEE-7E64DDD51E3B}"/>
+                  </a:ext>
+                </a:extLst>
+              </p:cNvPr>
+              <p:cNvSpPr txBox="1"/>
+              <p:nvPr/>
+            </p:nvSpPr>
+            <p:spPr>
+              <a:xfrm>
+                <a:off x="5510109" y="4073630"/>
+                <a:ext cx="172547" cy="276999"/>
+              </a:xfrm>
+              <a:prstGeom prst="rect">
+                <a:avLst/>
+              </a:prstGeom>
+              <a:noFill/>
+            </p:spPr>
+            <p:txBody>
+              <a:bodyPr wrap="none" lIns="0" tIns="0" rIns="0" bIns="0" rtlCol="0">
+                <a:spAutoFit/>
+              </a:bodyPr>
+              <a:lstStyle/>
+              <a:p>
+                <a:pPr/>
+                <a14:m>
+                  <m:oMathPara xmlns:m="http://schemas.openxmlformats.org/officeDocument/2006/math">
+                    <m:oMathParaPr>
+                      <m:jc m:val="centerGroup"/>
+                    </m:oMathParaPr>
+                    <m:oMath xmlns:m="http://schemas.openxmlformats.org/officeDocument/2006/math">
+                      <m:r>
+                        <a:rPr lang="en-US" b="0" i="1" smtClean="0">
+                          <a:latin typeface="Cambria Math" panose="02040503050406030204" pitchFamily="18" charset="0"/>
+                        </a:rPr>
+                        <m:t>𝜉</m:t>
+                      </m:r>
+                    </m:oMath>
+                  </m:oMathPara>
+                </a14:m>
+                <a:endParaRPr lang="en-US" b="0" dirty="0"/>
+              </a:p>
+            </p:txBody>
+          </p:sp>
+        </mc:Choice>
+        <mc:Fallback xmlns="">
+          <p:sp>
+            <p:nvSpPr>
+              <p:cNvPr id="12" name="Textfeld 11">
+                <a:extLst>
+                  <a:ext uri="{FF2B5EF4-FFF2-40B4-BE49-F238E27FC236}">
+                    <a16:creationId xmlns:a16="http://schemas.microsoft.com/office/drawing/2014/main" id="{2400FDE4-F3AE-4C9E-BDEE-7E64DDD51E3B}"/>
+                  </a:ext>
+                </a:extLst>
+              </p:cNvPr>
+              <p:cNvSpPr txBox="1">
+                <a:spLocks noRot="1" noChangeAspect="1" noMove="1" noResize="1" noEditPoints="1" noAdjustHandles="1" noChangeArrowheads="1" noChangeShapeType="1" noTextEdit="1"/>
+              </p:cNvSpPr>
+              <p:nvPr/>
+            </p:nvSpPr>
+            <p:spPr>
+              <a:xfrm>
+                <a:off x="5510109" y="4073630"/>
+                <a:ext cx="172547" cy="276999"/>
+              </a:xfrm>
+              <a:prstGeom prst="rect">
+                <a:avLst/>
+              </a:prstGeom>
+              <a:blipFill>
+                <a:blip r:embed="rId2"/>
+                <a:stretch>
+                  <a:fillRect l="-50000" t="-2174" r="-42857" b="-32609"/>
+                </a:stretch>
+              </a:blipFill>
+            </p:spPr>
+            <p:txBody>
+              <a:bodyPr/>
+              <a:lstStyle/>
+              <a:p>
+                <a:r>
+                  <a:rPr lang="de-DE">
+                    <a:noFill/>
+                  </a:rPr>
+                  <a:t> </a:t>
+                </a:r>
+              </a:p>
+            </p:txBody>
+          </p:sp>
+        </mc:Fallback>
+      </mc:AlternateContent>
+      <mc:AlternateContent xmlns:mc="http://schemas.openxmlformats.org/markup-compatibility/2006" xmlns:a14="http://schemas.microsoft.com/office/drawing/2010/main">
+        <mc:Choice Requires="a14">
+          <p:sp>
+            <p:nvSpPr>
+              <p:cNvPr id="13" name="Textfeld 12">
+                <a:extLst>
+                  <a:ext uri="{FF2B5EF4-FFF2-40B4-BE49-F238E27FC236}">
+                    <a16:creationId xmlns:a16="http://schemas.microsoft.com/office/drawing/2014/main" id="{08D097EF-DAF7-4F5E-B497-A2E876B67A70}"/>
+                  </a:ext>
+                </a:extLst>
+              </p:cNvPr>
+              <p:cNvSpPr txBox="1"/>
+              <p:nvPr/>
+            </p:nvSpPr>
+            <p:spPr>
+              <a:xfrm>
+                <a:off x="942042" y="0"/>
+                <a:ext cx="134343" cy="281667"/>
+              </a:xfrm>
+              <a:prstGeom prst="rect">
+                <a:avLst/>
+              </a:prstGeom>
+              <a:noFill/>
+            </p:spPr>
+            <p:txBody>
+              <a:bodyPr wrap="square" lIns="0" tIns="0" rIns="0" bIns="0" rtlCol="0">
+                <a:spAutoFit/>
+              </a:bodyPr>
+              <a:lstStyle/>
+              <a:p>
+                <a:pPr/>
+                <a14:m>
+                  <m:oMathPara xmlns:m="http://schemas.openxmlformats.org/officeDocument/2006/math">
+                    <m:oMathParaPr>
+                      <m:jc m:val="centerGroup"/>
+                    </m:oMathParaPr>
+                    <m:oMath xmlns:m="http://schemas.openxmlformats.org/officeDocument/2006/math">
+                      <m:r>
+                        <a:rPr lang="en-US" b="0" i="1" smtClean="0">
+                          <a:latin typeface="Cambria Math" panose="02040503050406030204" pitchFamily="18" charset="0"/>
+                        </a:rPr>
+                        <m:t>𝜂</m:t>
+                      </m:r>
+                    </m:oMath>
+                  </m:oMathPara>
+                </a14:m>
+                <a:endParaRPr lang="de-DE" dirty="0"/>
+              </a:p>
+            </p:txBody>
+          </p:sp>
+        </mc:Choice>
+        <mc:Fallback xmlns="">
+          <p:sp>
+            <p:nvSpPr>
+              <p:cNvPr id="13" name="Textfeld 12">
+                <a:extLst>
+                  <a:ext uri="{FF2B5EF4-FFF2-40B4-BE49-F238E27FC236}">
+                    <a16:creationId xmlns:a16="http://schemas.microsoft.com/office/drawing/2014/main" id="{08D097EF-DAF7-4F5E-B497-A2E876B67A70}"/>
+                  </a:ext>
+                </a:extLst>
+              </p:cNvPr>
+              <p:cNvSpPr txBox="1">
+                <a:spLocks noRot="1" noChangeAspect="1" noMove="1" noResize="1" noEditPoints="1" noAdjustHandles="1" noChangeArrowheads="1" noChangeShapeType="1" noTextEdit="1"/>
+              </p:cNvSpPr>
+              <p:nvPr/>
+            </p:nvSpPr>
+            <p:spPr>
+              <a:xfrm>
+                <a:off x="942042" y="0"/>
+                <a:ext cx="134343" cy="281667"/>
+              </a:xfrm>
+              <a:prstGeom prst="rect">
+                <a:avLst/>
+              </a:prstGeom>
+              <a:blipFill>
+                <a:blip r:embed="rId3"/>
+                <a:stretch>
+                  <a:fillRect l="-63636" r="-54545" b="-23913"/>
+                </a:stretch>
+              </a:blipFill>
+            </p:spPr>
+            <p:txBody>
+              <a:bodyPr/>
+              <a:lstStyle/>
+              <a:p>
+                <a:r>
+                  <a:rPr lang="de-DE">
+                    <a:noFill/>
+                  </a:rPr>
+                  <a:t> </a:t>
+                </a:r>
+              </a:p>
+            </p:txBody>
+          </p:sp>
+        </mc:Fallback>
+      </mc:AlternateContent>
+      <p:cxnSp>
+        <p:nvCxnSpPr>
+          <p:cNvPr id="15" name="Gerader Verbinder 14">
+            <a:extLst>
+              <a:ext uri="{FF2B5EF4-FFF2-40B4-BE49-F238E27FC236}">
+                <a16:creationId xmlns:a16="http://schemas.microsoft.com/office/drawing/2014/main" id="{407437A8-0599-4322-83C7-8869624DFCC9}"/>
+              </a:ext>
+            </a:extLst>
+          </p:cNvPr>
+          <p:cNvCxnSpPr/>
+          <p:nvPr/>
+        </p:nvCxnSpPr>
+        <p:spPr>
+          <a:xfrm>
+            <a:off x="1184728" y="762722"/>
+            <a:ext cx="0" cy="3185231"/>
+          </a:xfrm>
+          <a:prstGeom prst="line">
+            <a:avLst/>
+          </a:prstGeom>
+          <a:ln w="38100" cap="rnd">
+            <a:solidFill>
+              <a:schemeClr val="tx1"/>
+            </a:solidFill>
+          </a:ln>
+        </p:spPr>
+        <p:style>
+          <a:lnRef idx="1">
+            <a:schemeClr val="accent1"/>
+          </a:lnRef>
+          <a:fillRef idx="0">
+            <a:schemeClr val="accent1"/>
+          </a:fillRef>
+          <a:effectRef idx="0">
+            <a:schemeClr val="accent1"/>
+          </a:effectRef>
+          <a:fontRef idx="minor">
+            <a:schemeClr val="tx1"/>
+          </a:fontRef>
+        </p:style>
+      </p:cxnSp>
+      <p:cxnSp>
+        <p:nvCxnSpPr>
+          <p:cNvPr id="17" name="Gerader Verbinder 16">
+            <a:extLst>
+              <a:ext uri="{FF2B5EF4-FFF2-40B4-BE49-F238E27FC236}">
+                <a16:creationId xmlns:a16="http://schemas.microsoft.com/office/drawing/2014/main" id="{5B60155E-8B03-4090-A548-13A69D15A275}"/>
+              </a:ext>
+            </a:extLst>
+          </p:cNvPr>
+          <p:cNvCxnSpPr/>
+          <p:nvPr/>
+        </p:nvCxnSpPr>
+        <p:spPr>
+          <a:xfrm>
+            <a:off x="1184728" y="3947953"/>
+            <a:ext cx="3185231" cy="0"/>
+          </a:xfrm>
+          <a:prstGeom prst="line">
+            <a:avLst/>
+          </a:prstGeom>
+          <a:ln w="38100" cap="rnd">
+            <a:solidFill>
+              <a:schemeClr val="tx1"/>
+            </a:solidFill>
+          </a:ln>
+        </p:spPr>
+        <p:style>
+          <a:lnRef idx="1">
+            <a:schemeClr val="accent1"/>
+          </a:lnRef>
+          <a:fillRef idx="0">
+            <a:schemeClr val="accent1"/>
+          </a:fillRef>
+          <a:effectRef idx="0">
+            <a:schemeClr val="accent1"/>
+          </a:effectRef>
+          <a:fontRef idx="minor">
+            <a:schemeClr val="tx1"/>
+          </a:fontRef>
+        </p:style>
+      </p:cxnSp>
+      <mc:AlternateContent xmlns:mc="http://schemas.openxmlformats.org/markup-compatibility/2006" xmlns:a14="http://schemas.microsoft.com/office/drawing/2010/main">
+        <mc:Choice Requires="a14">
+          <p:sp>
+            <p:nvSpPr>
+              <p:cNvPr id="19" name="Textfeld 18">
+                <a:extLst>
+                  <a:ext uri="{FF2B5EF4-FFF2-40B4-BE49-F238E27FC236}">
+                    <a16:creationId xmlns:a16="http://schemas.microsoft.com/office/drawing/2014/main" id="{04B53AB3-28DF-4232-8F49-4E7DCD1617ED}"/>
+                  </a:ext>
+                </a:extLst>
+              </p:cNvPr>
+              <p:cNvSpPr txBox="1"/>
+              <p:nvPr/>
+            </p:nvSpPr>
+            <p:spPr>
+              <a:xfrm>
+                <a:off x="806745" y="4073629"/>
+                <a:ext cx="1114857" cy="276999"/>
+              </a:xfrm>
+              <a:prstGeom prst="rect">
+                <a:avLst/>
+              </a:prstGeom>
+              <a:noFill/>
+            </p:spPr>
+            <p:txBody>
+              <a:bodyPr wrap="none" lIns="0" tIns="0" rIns="0" bIns="0" rtlCol="0">
+                <a:spAutoFit/>
+              </a:bodyPr>
+              <a:lstStyle/>
+              <a:p>
+                <a:pPr/>
+                <a14:m>
+                  <m:oMathPara xmlns:m="http://schemas.openxmlformats.org/officeDocument/2006/math">
+                    <m:oMathParaPr>
+                      <m:jc m:val="centerGroup"/>
+                    </m:oMathParaPr>
+                    <m:oMath xmlns:m="http://schemas.openxmlformats.org/officeDocument/2006/math">
+                      <m:sSub>
+                        <m:sSubPr>
+                          <m:ctrlPr>
+                            <a:rPr lang="en-US" b="0" i="1" smtClean="0">
+                              <a:latin typeface="Cambria Math" panose="02040503050406030204" pitchFamily="18" charset="0"/>
+                            </a:rPr>
+                          </m:ctrlPr>
+                        </m:sSubPr>
+                        <m:e>
+                          <m:r>
+                            <a:rPr lang="en-US" b="0" i="1" smtClean="0">
+                              <a:latin typeface="Cambria Math" panose="02040503050406030204" pitchFamily="18" charset="0"/>
+                            </a:rPr>
+                            <m:t>𝑃</m:t>
+                          </m:r>
+                        </m:e>
+                        <m:sub>
+                          <m:r>
+                            <a:rPr lang="en-US" b="0" i="1" smtClean="0">
+                              <a:latin typeface="Cambria Math" panose="02040503050406030204" pitchFamily="18" charset="0"/>
+                            </a:rPr>
+                            <m:t>0</m:t>
+                          </m:r>
+                        </m:sub>
+                      </m:sSub>
+                      <m:r>
+                        <a:rPr lang="en-US" b="0" i="1" smtClean="0">
+                          <a:latin typeface="Cambria Math" panose="02040503050406030204" pitchFamily="18" charset="0"/>
+                        </a:rPr>
+                        <m:t>=(0,0)</m:t>
+                      </m:r>
+                    </m:oMath>
+                  </m:oMathPara>
+                </a14:m>
+                <a:endParaRPr lang="de-DE" dirty="0"/>
+              </a:p>
+            </p:txBody>
+          </p:sp>
+        </mc:Choice>
+        <mc:Fallback xmlns="">
+          <p:sp>
+            <p:nvSpPr>
+              <p:cNvPr id="19" name="Textfeld 18">
+                <a:extLst>
+                  <a:ext uri="{FF2B5EF4-FFF2-40B4-BE49-F238E27FC236}">
+                    <a16:creationId xmlns:a16="http://schemas.microsoft.com/office/drawing/2014/main" id="{04B53AB3-28DF-4232-8F49-4E7DCD1617ED}"/>
+                  </a:ext>
+                </a:extLst>
+              </p:cNvPr>
+              <p:cNvSpPr txBox="1">
+                <a:spLocks noRot="1" noChangeAspect="1" noMove="1" noResize="1" noEditPoints="1" noAdjustHandles="1" noChangeArrowheads="1" noChangeShapeType="1" noTextEdit="1"/>
+              </p:cNvSpPr>
+              <p:nvPr/>
+            </p:nvSpPr>
+            <p:spPr>
+              <a:xfrm>
+                <a:off x="806745" y="4073629"/>
+                <a:ext cx="1114857" cy="276999"/>
+              </a:xfrm>
+              <a:prstGeom prst="rect">
+                <a:avLst/>
+              </a:prstGeom>
+              <a:blipFill>
+                <a:blip r:embed="rId4"/>
+                <a:stretch>
+                  <a:fillRect l="-2732" t="-2174" r="-6011" b="-32609"/>
+                </a:stretch>
+              </a:blipFill>
+            </p:spPr>
+            <p:txBody>
+              <a:bodyPr/>
+              <a:lstStyle/>
+              <a:p>
+                <a:r>
+                  <a:rPr lang="de-DE">
+                    <a:noFill/>
+                  </a:rPr>
+                  <a:t> </a:t>
+                </a:r>
+              </a:p>
+            </p:txBody>
+          </p:sp>
+        </mc:Fallback>
+      </mc:AlternateContent>
+      <mc:AlternateContent xmlns:mc="http://schemas.openxmlformats.org/markup-compatibility/2006">
+        <mc:Choice xmlns:a14="http://schemas.microsoft.com/office/drawing/2010/main" Requires="a14">
+          <p:sp>
+            <p:nvSpPr>
+              <p:cNvPr id="20" name="Textfeld 19">
+                <a:extLst>
+                  <a:ext uri="{FF2B5EF4-FFF2-40B4-BE49-F238E27FC236}">
+                    <a16:creationId xmlns:a16="http://schemas.microsoft.com/office/drawing/2014/main" id="{BB585A41-9EB7-43EE-9DE4-CDEFE6254C57}"/>
+                  </a:ext>
+                </a:extLst>
+              </p:cNvPr>
+              <p:cNvSpPr txBox="1"/>
+              <p:nvPr/>
+            </p:nvSpPr>
+            <p:spPr>
+              <a:xfrm>
+                <a:off x="3960267" y="4073628"/>
+                <a:ext cx="1071062" cy="276999"/>
+              </a:xfrm>
+              <a:prstGeom prst="rect">
+                <a:avLst/>
+              </a:prstGeom>
+              <a:noFill/>
+            </p:spPr>
+            <p:txBody>
+              <a:bodyPr wrap="none" lIns="0" tIns="0" rIns="0" bIns="0" rtlCol="0">
+                <a:spAutoFit/>
+              </a:bodyPr>
+              <a:lstStyle/>
+              <a:p>
+                <a:pPr/>
+                <a14:m>
+                  <m:oMathPara xmlns:m="http://schemas.openxmlformats.org/officeDocument/2006/math">
+                    <m:oMathParaPr>
+                      <m:jc m:val="centerGroup"/>
+                    </m:oMathParaPr>
+                    <m:oMath xmlns:m="http://schemas.openxmlformats.org/officeDocument/2006/math">
+                      <m:sSub>
+                        <m:sSubPr>
+                          <m:ctrlPr>
+                            <a:rPr lang="en-US" b="0" i="1" smtClean="0">
+                              <a:latin typeface="Cambria Math" panose="02040503050406030204" pitchFamily="18" charset="0"/>
+                            </a:rPr>
+                          </m:ctrlPr>
+                        </m:sSubPr>
+                        <m:e>
+                          <m:r>
+                            <a:rPr lang="en-US" b="0" i="1" smtClean="0">
+                              <a:latin typeface="Cambria Math" panose="02040503050406030204" pitchFamily="18" charset="0"/>
+                            </a:rPr>
+                            <m:t>𝑃</m:t>
+                          </m:r>
+                        </m:e>
+                        <m:sub>
+                          <m:r>
+                            <a:rPr lang="en-US" b="0" i="1" smtClean="0">
+                              <a:latin typeface="Cambria Math" panose="02040503050406030204" pitchFamily="18" charset="0"/>
+                            </a:rPr>
+                            <m:t>1</m:t>
+                          </m:r>
+                        </m:sub>
+                      </m:sSub>
+                      <m:r>
+                        <a:rPr lang="en-US" b="0" i="1" smtClean="0">
+                          <a:latin typeface="Cambria Math" panose="02040503050406030204" pitchFamily="18" charset="0"/>
+                        </a:rPr>
+                        <m:t>=(1,0)</m:t>
+                      </m:r>
+                    </m:oMath>
+                  </m:oMathPara>
+                </a14:m>
+                <a:endParaRPr lang="de-DE" dirty="0"/>
+              </a:p>
+            </p:txBody>
+          </p:sp>
+        </mc:Choice>
+        <mc:Fallback>
+          <p:sp>
+            <p:nvSpPr>
+              <p:cNvPr id="20" name="Textfeld 19">
+                <a:extLst>
+                  <a:ext uri="{FF2B5EF4-FFF2-40B4-BE49-F238E27FC236}">
+                    <a16:creationId xmlns:a16="http://schemas.microsoft.com/office/drawing/2014/main" id="{BB585A41-9EB7-43EE-9DE4-CDEFE6254C57}"/>
+                  </a:ext>
+                </a:extLst>
+              </p:cNvPr>
+              <p:cNvSpPr txBox="1">
+                <a:spLocks noRot="1" noChangeAspect="1" noMove="1" noResize="1" noEditPoints="1" noAdjustHandles="1" noChangeArrowheads="1" noChangeShapeType="1" noTextEdit="1"/>
+              </p:cNvSpPr>
+              <p:nvPr/>
+            </p:nvSpPr>
+            <p:spPr>
+              <a:xfrm>
+                <a:off x="3960267" y="4073628"/>
+                <a:ext cx="1071062" cy="276999"/>
+              </a:xfrm>
+              <a:prstGeom prst="rect">
+                <a:avLst/>
+              </a:prstGeom>
+              <a:blipFill>
+                <a:blip r:embed="rId5"/>
+                <a:stretch>
+                  <a:fillRect l="-5143" t="-2174" r="-8000" b="-32609"/>
+                </a:stretch>
+              </a:blipFill>
+            </p:spPr>
+            <p:txBody>
+              <a:bodyPr/>
+              <a:lstStyle/>
+              <a:p>
+                <a:r>
+                  <a:rPr lang="de-DE">
+                    <a:noFill/>
+                  </a:rPr>
+                  <a:t> </a:t>
+                </a:r>
+              </a:p>
+            </p:txBody>
+          </p:sp>
+        </mc:Fallback>
+      </mc:AlternateContent>
+      <mc:AlternateContent xmlns:mc="http://schemas.openxmlformats.org/markup-compatibility/2006" xmlns:a14="http://schemas.microsoft.com/office/drawing/2010/main">
+        <mc:Choice Requires="a14">
+          <p:sp>
+            <p:nvSpPr>
+              <p:cNvPr id="21" name="Textfeld 20">
+                <a:extLst>
+                  <a:ext uri="{FF2B5EF4-FFF2-40B4-BE49-F238E27FC236}">
+                    <a16:creationId xmlns:a16="http://schemas.microsoft.com/office/drawing/2014/main" id="{8728D981-2727-4457-AFAA-A41FF642F8F1}"/>
+                  </a:ext>
+                </a:extLst>
+              </p:cNvPr>
+              <p:cNvSpPr txBox="1"/>
+              <p:nvPr/>
+            </p:nvSpPr>
+            <p:spPr>
+              <a:xfrm>
+                <a:off x="0" y="624222"/>
+                <a:ext cx="1076385" cy="276999"/>
+              </a:xfrm>
+              <a:prstGeom prst="rect">
+                <a:avLst/>
+              </a:prstGeom>
+              <a:noFill/>
+            </p:spPr>
+            <p:txBody>
+              <a:bodyPr wrap="none" lIns="0" tIns="0" rIns="0" bIns="0" rtlCol="0">
+                <a:spAutoFit/>
+              </a:bodyPr>
+              <a:lstStyle/>
+              <a:p>
+                <a:pPr/>
+                <a14:m>
+                  <m:oMathPara xmlns:m="http://schemas.openxmlformats.org/officeDocument/2006/math">
+                    <m:oMathParaPr>
+                      <m:jc m:val="centerGroup"/>
+                    </m:oMathParaPr>
+                    <m:oMath xmlns:m="http://schemas.openxmlformats.org/officeDocument/2006/math">
+                      <m:sSub>
+                        <m:sSubPr>
+                          <m:ctrlPr>
+                            <a:rPr lang="en-US" b="0" i="1" smtClean="0">
+                              <a:latin typeface="Cambria Math" panose="02040503050406030204" pitchFamily="18" charset="0"/>
+                            </a:rPr>
+                          </m:ctrlPr>
+                        </m:sSubPr>
+                        <m:e>
+                          <m:r>
+                            <a:rPr lang="en-US" b="0" i="1" smtClean="0">
+                              <a:latin typeface="Cambria Math" panose="02040503050406030204" pitchFamily="18" charset="0"/>
+                            </a:rPr>
+                            <m:t>𝑃</m:t>
+                          </m:r>
+                        </m:e>
+                        <m:sub>
+                          <m:r>
+                            <a:rPr lang="en-US" b="0" i="1" smtClean="0">
+                              <a:latin typeface="Cambria Math" panose="02040503050406030204" pitchFamily="18" charset="0"/>
+                            </a:rPr>
+                            <m:t>2</m:t>
+                          </m:r>
+                        </m:sub>
+                      </m:sSub>
+                      <m:r>
+                        <a:rPr lang="en-US" b="0" i="1" smtClean="0">
+                          <a:latin typeface="Cambria Math" panose="02040503050406030204" pitchFamily="18" charset="0"/>
+                        </a:rPr>
+                        <m:t>=(0,1)</m:t>
+                      </m:r>
+                    </m:oMath>
+                  </m:oMathPara>
+                </a14:m>
+                <a:endParaRPr lang="de-DE" dirty="0"/>
+              </a:p>
+            </p:txBody>
+          </p:sp>
+        </mc:Choice>
+        <mc:Fallback xmlns="">
+          <p:sp>
+            <p:nvSpPr>
+              <p:cNvPr id="21" name="Textfeld 20">
+                <a:extLst>
+                  <a:ext uri="{FF2B5EF4-FFF2-40B4-BE49-F238E27FC236}">
+                    <a16:creationId xmlns:a16="http://schemas.microsoft.com/office/drawing/2014/main" id="{8728D981-2727-4457-AFAA-A41FF642F8F1}"/>
+                  </a:ext>
+                </a:extLst>
+              </p:cNvPr>
+              <p:cNvSpPr txBox="1">
+                <a:spLocks noRot="1" noChangeAspect="1" noMove="1" noResize="1" noEditPoints="1" noAdjustHandles="1" noChangeArrowheads="1" noChangeShapeType="1" noTextEdit="1"/>
+              </p:cNvSpPr>
+              <p:nvPr/>
+            </p:nvSpPr>
+            <p:spPr>
+              <a:xfrm>
+                <a:off x="0" y="624222"/>
+                <a:ext cx="1076385" cy="276999"/>
+              </a:xfrm>
+              <a:prstGeom prst="rect">
+                <a:avLst/>
+              </a:prstGeom>
+              <a:blipFill>
+                <a:blip r:embed="rId6"/>
+                <a:stretch>
+                  <a:fillRect l="-4520" t="-2174" r="-7345" b="-32609"/>
+                </a:stretch>
+              </a:blipFill>
+            </p:spPr>
+            <p:txBody>
+              <a:bodyPr/>
+              <a:lstStyle/>
+              <a:p>
+                <a:r>
+                  <a:rPr lang="de-DE">
+                    <a:noFill/>
+                  </a:rPr>
+                  <a:t> </a:t>
+                </a:r>
+              </a:p>
+            </p:txBody>
+          </p:sp>
+        </mc:Fallback>
+      </mc:AlternateContent>
+    </p:spTree>
+    <p:extLst>
+      <p:ext uri="{BB962C8B-B14F-4D97-AF65-F5344CB8AC3E}">
+        <p14:creationId xmlns:p14="http://schemas.microsoft.com/office/powerpoint/2010/main" val="3410822572"/>
       </p:ext>
     </p:extLst>
   </p:cSld>

</xml_diff>